<commit_message>
Hürden aktualisiert Ausblick aktualisiert
</commit_message>
<xml_diff>
--- a/TestenMileStone1.pptx
+++ b/TestenMileStone1.pptx
@@ -5,10 +5,10 @@
     <p:sldMasterId id="2147483648" r:id="rId2"/>
   </p:sldMasterIdLst>
   <p:notesMasterIdLst>
-    <p:notesMasterId r:id="rId8"/>
+    <p:notesMasterId r:id="rId10"/>
   </p:notesMasterIdLst>
   <p:handoutMasterIdLst>
-    <p:handoutMasterId r:id="rId9"/>
+    <p:handoutMasterId r:id="rId11"/>
   </p:handoutMasterIdLst>
   <p:sldIdLst>
     <p:sldId id="256" r:id="rId3"/>
@@ -16,6 +16,8 @@
     <p:sldId id="258" r:id="rId5"/>
     <p:sldId id="259" r:id="rId6"/>
     <p:sldId id="260" r:id="rId7"/>
+    <p:sldId id="262" r:id="rId8"/>
+    <p:sldId id="263" r:id="rId9"/>
   </p:sldIdLst>
   <p:sldSz cx="12192000" cy="6858000"/>
   <p:notesSz cx="6858000" cy="9144000"/>
@@ -218,7 +220,7 @@
           <a:p>
             <a:fld id="{65DD71D7-55AC-46BD-81B3-09AB2F9EFBD8}" type="datetimeFigureOut">
               <a:rPr lang="de-DE" smtClean="0"/>
-              <a:t>12.10.2015</a:t>
+              <a:t>16.10.2015</a:t>
             </a:fld>
             <a:endParaRPr lang="de-DE" dirty="0"/>
           </a:p>
@@ -383,7 +385,7 @@
           <a:p>
             <a:fld id="{1F89424F-BB59-4F4E-9822-4CA3E770FFD2}" type="datetimeFigureOut">
               <a:rPr lang="de-DE" smtClean="0"/>
-              <a:t>12.10.2015</a:t>
+              <a:t>16.10.2015</a:t>
             </a:fld>
             <a:endParaRPr lang="de-DE" dirty="0"/>
           </a:p>
@@ -1110,7 +1112,7 @@
           <a:p>
             <a:fld id="{537F698A-8CEE-4BF3-BEC8-0ABA6C1BFF10}" type="datetime1">
               <a:rPr lang="de-DE" smtClean="0"/>
-              <a:t>12.10.2015</a:t>
+              <a:t>16.10.2015</a:t>
             </a:fld>
             <a:endParaRPr lang="de-DE" dirty="0"/>
           </a:p>
@@ -1132,8 +1134,8 @@
           <a:lstStyle/>
           <a:p>
             <a:r>
-              <a:rPr lang="de-DE" smtClean="0"/>
-              <a:t>Daniel, Bianca, Maxim und Aljoscha</a:t>
+              <a:rPr lang="de-DE" dirty="0" smtClean="0"/>
+              <a:t>Daniel Gehn, Bianca Niklass, Maxim Rjabenko und Aljoscha Czepoks</a:t>
             </a:r>
             <a:endParaRPr lang="de-DE" dirty="0"/>
           </a:p>
@@ -1184,6 +1186,13 @@
       </p:transition>
     </mc:Fallback>
   </mc:AlternateContent>
+  <p:timing>
+    <p:tnLst>
+      <p:par>
+        <p:cTn id="1" dur="indefinite" restart="never" nodeType="tmRoot"/>
+      </p:par>
+    </p:tnLst>
+  </p:timing>
 </p:sldLayout>
 </file>
 
@@ -1306,7 +1315,7 @@
           <a:p>
             <a:fld id="{21EA3026-B01D-4A07-9460-F7E0EBAC28CD}" type="datetime1">
               <a:rPr lang="de-DE" smtClean="0"/>
-              <a:t>12.10.2015</a:t>
+              <a:t>16.10.2015</a:t>
             </a:fld>
             <a:endParaRPr lang="de-DE" dirty="0"/>
           </a:p>
@@ -1328,8 +1337,8 @@
           <a:lstStyle/>
           <a:p>
             <a:r>
-              <a:rPr lang="de-DE" smtClean="0"/>
-              <a:t>Daniel, Bianca, Maxim und Aljoscha</a:t>
+              <a:rPr lang="de-DE" dirty="0" smtClean="0"/>
+              <a:t>Daniel Gehn, Bianca Niklass, Maxim Rjabenko und Aljoscha Czepoks</a:t>
             </a:r>
             <a:endParaRPr lang="de-DE" dirty="0"/>
           </a:p>
@@ -1380,6 +1389,13 @@
       </p:transition>
     </mc:Fallback>
   </mc:AlternateContent>
+  <p:timing>
+    <p:tnLst>
+      <p:par>
+        <p:cTn id="1" dur="indefinite" restart="never" nodeType="tmRoot"/>
+      </p:par>
+    </p:tnLst>
+  </p:timing>
 </p:sldLayout>
 </file>
 
@@ -1492,7 +1508,7 @@
           <a:p>
             <a:fld id="{F66A0F23-FBCB-420B-8C36-8A5C93F98E1D}" type="datetime1">
               <a:rPr lang="de-DE" smtClean="0"/>
-              <a:t>12.10.2015</a:t>
+              <a:t>16.10.2015</a:t>
             </a:fld>
             <a:endParaRPr lang="de-DE" dirty="0"/>
           </a:p>
@@ -1514,8 +1530,8 @@
           <a:lstStyle/>
           <a:p>
             <a:r>
-              <a:rPr lang="de-DE" smtClean="0"/>
-              <a:t>Daniel, Bianca, Maxim und Aljoscha</a:t>
+              <a:rPr lang="de-DE" dirty="0" smtClean="0"/>
+              <a:t>Daniel Gehn, Bianca Niklass, Maxim Rjabenko und Aljoscha Czepoks</a:t>
             </a:r>
             <a:endParaRPr lang="de-DE" dirty="0"/>
           </a:p>
@@ -1566,6 +1582,13 @@
       </p:transition>
     </mc:Fallback>
   </mc:AlternateContent>
+  <p:timing>
+    <p:tnLst>
+      <p:par>
+        <p:cTn id="1" dur="indefinite" restart="never" nodeType="tmRoot"/>
+      </p:par>
+    </p:tnLst>
+  </p:timing>
   <p:extLst mod="1">
     <p:ext uri="{DCECCB84-F9BA-43D5-87BE-67443E8EF086}">
       <p15:sldGuideLst xmlns:p15="http://schemas.microsoft.com/office/powerpoint/2012/main"/>
@@ -1857,6 +1880,13 @@
       </p:transition>
     </mc:Fallback>
   </mc:AlternateContent>
+  <p:timing>
+    <p:tnLst>
+      <p:par>
+        <p:cTn id="1" dur="indefinite" restart="never" nodeType="tmRoot"/>
+      </p:par>
+    </p:tnLst>
+  </p:timing>
 </p:sldLayout>
 </file>
 
@@ -2091,7 +2121,7 @@
           <a:p>
             <a:fld id="{8A458D03-FBAF-4BE9-900A-26E29E2C0671}" type="datetime1">
               <a:rPr lang="de-DE" smtClean="0"/>
-              <a:t>12.10.2015</a:t>
+              <a:t>16.10.2015</a:t>
             </a:fld>
             <a:endParaRPr lang="de-DE" dirty="0"/>
           </a:p>
@@ -2113,8 +2143,8 @@
           <a:lstStyle/>
           <a:p>
             <a:r>
-              <a:rPr lang="de-DE" smtClean="0"/>
-              <a:t>Daniel, Bianca, Maxim und Aljoscha</a:t>
+              <a:rPr lang="de-DE" dirty="0" smtClean="0"/>
+              <a:t>Daniel Gehn, Bianca Niklass, Maxim Rjabenko und Aljoscha Czepoks</a:t>
             </a:r>
             <a:endParaRPr lang="de-DE" dirty="0"/>
           </a:p>
@@ -2165,6 +2195,13 @@
       </p:transition>
     </mc:Fallback>
   </mc:AlternateContent>
+  <p:timing>
+    <p:tnLst>
+      <p:par>
+        <p:cTn id="1" dur="indefinite" restart="never" nodeType="tmRoot"/>
+      </p:par>
+    </p:tnLst>
+  </p:timing>
 </p:sldLayout>
 </file>
 
@@ -2539,7 +2576,7 @@
           <a:p>
             <a:fld id="{E70E15B3-2ABA-4AD8-8437-D701EFDB75E9}" type="datetime1">
               <a:rPr lang="de-DE" smtClean="0"/>
-              <a:t>12.10.2015</a:t>
+              <a:t>16.10.2015</a:t>
             </a:fld>
             <a:endParaRPr lang="de-DE" dirty="0"/>
           </a:p>
@@ -2561,8 +2598,8 @@
           <a:lstStyle/>
           <a:p>
             <a:r>
-              <a:rPr lang="de-DE" smtClean="0"/>
-              <a:t>Daniel, Bianca, Maxim und Aljoscha</a:t>
+              <a:rPr lang="de-DE" dirty="0" smtClean="0"/>
+              <a:t>Daniel Gehn, Bianca Niklass, Maxim Rjabenko und Aljoscha Czepoks</a:t>
             </a:r>
             <a:endParaRPr lang="de-DE" dirty="0"/>
           </a:p>
@@ -2613,6 +2650,13 @@
       </p:transition>
     </mc:Fallback>
   </mc:AlternateContent>
+  <p:timing>
+    <p:tnLst>
+      <p:par>
+        <p:cTn id="1" dur="indefinite" restart="never" nodeType="tmRoot"/>
+      </p:par>
+    </p:tnLst>
+  </p:timing>
 </p:sldLayout>
 </file>
 
@@ -2673,7 +2717,7 @@
           <a:p>
             <a:fld id="{EC022FFA-086D-48E4-A3A9-F2E6ADCC7A7A}" type="datetime1">
               <a:rPr lang="de-DE" smtClean="0"/>
-              <a:t>12.10.2015</a:t>
+              <a:t>16.10.2015</a:t>
             </a:fld>
             <a:endParaRPr lang="de-DE" dirty="0"/>
           </a:p>
@@ -2695,8 +2739,8 @@
           <a:lstStyle/>
           <a:p>
             <a:r>
-              <a:rPr lang="de-DE" smtClean="0"/>
-              <a:t>Daniel, Bianca, Maxim und Aljoscha</a:t>
+              <a:rPr lang="de-DE" dirty="0" smtClean="0"/>
+              <a:t>Daniel Gehn, Bianca Niklass, Maxim Rjabenko und Aljoscha Czepoks</a:t>
             </a:r>
             <a:endParaRPr lang="de-DE" dirty="0"/>
           </a:p>
@@ -2747,6 +2791,13 @@
       </p:transition>
     </mc:Fallback>
   </mc:AlternateContent>
+  <p:timing>
+    <p:tnLst>
+      <p:par>
+        <p:cTn id="1" dur="indefinite" restart="never" nodeType="tmRoot"/>
+      </p:par>
+    </p:tnLst>
+  </p:timing>
 </p:sldLayout>
 </file>
 
@@ -2784,7 +2835,7 @@
           <a:p>
             <a:fld id="{2ABA1BE5-10BE-4EC0-8AF8-1FF2CE7C8C7C}" type="datetime1">
               <a:rPr lang="de-DE" smtClean="0"/>
-              <a:t>12.10.2015</a:t>
+              <a:t>16.10.2015</a:t>
             </a:fld>
             <a:endParaRPr lang="de-DE" dirty="0"/>
           </a:p>
@@ -2806,8 +2857,8 @@
           <a:lstStyle/>
           <a:p>
             <a:r>
-              <a:rPr lang="de-DE" smtClean="0"/>
-              <a:t>Daniel, Bianca, Maxim und Aljoscha</a:t>
+              <a:rPr lang="de-DE" dirty="0" smtClean="0"/>
+              <a:t>Daniel Gehn, Bianca Niklass, Maxim Rjabenko und Aljoscha Czepoks</a:t>
             </a:r>
             <a:endParaRPr lang="de-DE" dirty="0"/>
           </a:p>
@@ -2858,6 +2909,13 @@
       </p:transition>
     </mc:Fallback>
   </mc:AlternateContent>
+  <p:timing>
+    <p:tnLst>
+      <p:par>
+        <p:cTn id="1" dur="indefinite" restart="never" nodeType="tmRoot"/>
+      </p:par>
+    </p:tnLst>
+  </p:timing>
 </p:sldLayout>
 </file>
 
@@ -3213,7 +3271,7 @@
           <a:p>
             <a:fld id="{06AEED3C-F3D4-413C-88C0-8F79A6BD5893}" type="datetime1">
               <a:rPr lang="de-DE" smtClean="0"/>
-              <a:t>12.10.2015</a:t>
+              <a:t>16.10.2015</a:t>
             </a:fld>
             <a:endParaRPr lang="de-DE" dirty="0"/>
           </a:p>
@@ -3235,8 +3293,8 @@
           <a:lstStyle/>
           <a:p>
             <a:r>
-              <a:rPr lang="de-DE" smtClean="0"/>
-              <a:t>Daniel, Bianca, Maxim und Aljoscha</a:t>
+              <a:rPr lang="de-DE" dirty="0" smtClean="0"/>
+              <a:t>Daniel Gehn, Bianca Niklass, Maxim Rjabenko und Aljoscha Czepoks</a:t>
             </a:r>
             <a:endParaRPr lang="de-DE" dirty="0"/>
           </a:p>
@@ -3287,6 +3345,13 @@
       </p:transition>
     </mc:Fallback>
   </mc:AlternateContent>
+  <p:timing>
+    <p:tnLst>
+      <p:par>
+        <p:cTn id="1" dur="indefinite" restart="never" nodeType="tmRoot"/>
+      </p:par>
+    </p:tnLst>
+  </p:timing>
 </p:sldLayout>
 </file>
 
@@ -3632,7 +3697,7 @@
           <a:p>
             <a:fld id="{8A0BF93F-18FA-420B-8AAE-FD2EDBFEC862}" type="datetime1">
               <a:rPr lang="de-DE" smtClean="0"/>
-              <a:t>12.10.2015</a:t>
+              <a:t>16.10.2015</a:t>
             </a:fld>
             <a:endParaRPr lang="de-DE" dirty="0"/>
           </a:p>
@@ -3654,8 +3719,8 @@
           <a:lstStyle/>
           <a:p>
             <a:r>
-              <a:rPr lang="de-DE" smtClean="0"/>
-              <a:t>Daniel, Bianca, Maxim und Aljoscha</a:t>
+              <a:rPr lang="de-DE" dirty="0" smtClean="0"/>
+              <a:t>Daniel Gehn, Bianca Niklass, Maxim Rjabenko und Aljoscha Czepoks</a:t>
             </a:r>
             <a:endParaRPr lang="de-DE" dirty="0"/>
           </a:p>
@@ -3706,6 +3771,13 @@
       </p:transition>
     </mc:Fallback>
   </mc:AlternateContent>
+  <p:timing>
+    <p:tnLst>
+      <p:par>
+        <p:cTn id="1" dur="indefinite" restart="never" nodeType="tmRoot"/>
+      </p:par>
+    </p:tnLst>
+  </p:timing>
 </p:sldLayout>
 </file>
 
@@ -3909,7 +3981,7 @@
           <a:p>
             <a:fld id="{88460AF1-5B98-4D10-B224-FDE8F6480635}" type="datetime1">
               <a:rPr lang="de-DE" smtClean="0"/>
-              <a:t>12.10.2015</a:t>
+              <a:t>16.10.2015</a:t>
             </a:fld>
             <a:endParaRPr lang="de-DE" dirty="0"/>
           </a:p>
@@ -4486,13 +4558,13 @@
   <p:clrMapOvr>
     <a:masterClrMapping/>
   </p:clrMapOvr>
-  <mc:AlternateContent xmlns:mc="http://schemas.openxmlformats.org/markup-compatibility/2006">
-    <mc:Choice xmlns:p14="http://schemas.microsoft.com/office/powerpoint/2010/main" Requires="p14">
+  <mc:AlternateContent xmlns:mc="http://schemas.openxmlformats.org/markup-compatibility/2006" xmlns:p14="http://schemas.microsoft.com/office/powerpoint/2010/main">
+    <mc:Choice Requires="p14">
       <p:transition spd="med" p14:dur="700">
         <p:fade/>
       </p:transition>
     </mc:Choice>
-    <mc:Fallback>
+    <mc:Fallback xmlns="">
       <p:transition spd="med">
         <p:fade/>
       </p:transition>
@@ -4571,14 +4643,27 @@
           <a:p>
             <a:r>
               <a:rPr lang="de-DE" dirty="0" smtClean="0"/>
-              <a:t>Hürden </a:t>
-            </a:r>
+              <a:t>Hürden</a:t>
+            </a:r>
+          </a:p>
+          <a:p>
+            <a:pPr lvl="1"/>
+            <a:r>
+              <a:rPr lang="de-DE" dirty="0" smtClean="0"/>
+              <a:t>Lösungen</a:t>
+            </a:r>
+            <a:r>
+              <a:rPr lang="de-DE" dirty="0" smtClean="0"/>
+              <a:t> </a:t>
+            </a:r>
+            <a:endParaRPr lang="de-DE" dirty="0" smtClean="0"/>
           </a:p>
           <a:p>
             <a:r>
               <a:rPr lang="de-DE" dirty="0" smtClean="0"/>
               <a:t>Ausblick</a:t>
             </a:r>
+            <a:endParaRPr lang="de-DE" dirty="0" smtClean="0"/>
           </a:p>
           <a:p>
             <a:pPr lvl="1"/>
@@ -4608,8 +4693,16 @@
           <a:lstStyle/>
           <a:p>
             <a:r>
-              <a:rPr lang="de-DE" smtClean="0"/>
-              <a:t>Daniel, Bianca, Maxim und Aljoscha</a:t>
+              <a:rPr lang="de-DE" dirty="0" smtClean="0"/>
+              <a:t>Daniel Gehn, Bianca Niklass, Maxim Rjabenko </a:t>
+            </a:r>
+            <a:r>
+              <a:rPr lang="de-DE" dirty="0" smtClean="0"/>
+              <a:t>und </a:t>
+            </a:r>
+            <a:r>
+              <a:rPr lang="de-DE" dirty="0" smtClean="0"/>
+              <a:t>Aljoscha Czepoks</a:t>
             </a:r>
             <a:endParaRPr lang="de-DE" dirty="0"/>
           </a:p>
@@ -4648,18 +4741,25 @@
   <p:clrMapOvr>
     <a:masterClrMapping/>
   </p:clrMapOvr>
-  <mc:AlternateContent xmlns:mc="http://schemas.openxmlformats.org/markup-compatibility/2006">
-    <mc:Choice xmlns:p14="http://schemas.microsoft.com/office/powerpoint/2010/main" Requires="p14">
+  <mc:AlternateContent xmlns:mc="http://schemas.openxmlformats.org/markup-compatibility/2006" xmlns:p14="http://schemas.microsoft.com/office/powerpoint/2010/main">
+    <mc:Choice Requires="p14">
       <p:transition spd="med" p14:dur="700">
         <p:fade/>
       </p:transition>
     </mc:Choice>
-    <mc:Fallback>
+    <mc:Fallback xmlns="">
       <p:transition spd="med">
         <p:fade/>
       </p:transition>
     </mc:Fallback>
   </mc:AlternateContent>
+  <p:timing>
+    <p:tnLst>
+      <p:par>
+        <p:cTn id="1" dur="indefinite" restart="never" nodeType="tmRoot"/>
+      </p:par>
+    </p:tnLst>
+  </p:timing>
 </p:sld>
 </file>
 
@@ -4738,8 +4838,8 @@
           <a:lstStyle/>
           <a:p>
             <a:r>
-              <a:rPr lang="de-DE" smtClean="0"/>
-              <a:t>Daniel, Bianca, Maxim und Aljoscha</a:t>
+              <a:rPr lang="de-DE" dirty="0"/>
+              <a:t>Daniel Gehn, Bianca Niklass, Maxim Rjabenko und Aljoscha Czepoks</a:t>
             </a:r>
             <a:endParaRPr lang="de-DE" dirty="0"/>
           </a:p>
@@ -4778,18 +4878,25 @@
   <p:clrMapOvr>
     <a:masterClrMapping/>
   </p:clrMapOvr>
-  <mc:AlternateContent xmlns:mc="http://schemas.openxmlformats.org/markup-compatibility/2006">
-    <mc:Choice xmlns:p14="http://schemas.microsoft.com/office/powerpoint/2010/main" Requires="p14">
+  <mc:AlternateContent xmlns:mc="http://schemas.openxmlformats.org/markup-compatibility/2006" xmlns:p14="http://schemas.microsoft.com/office/powerpoint/2010/main">
+    <mc:Choice Requires="p14">
       <p:transition spd="med" p14:dur="700">
         <p:fade/>
       </p:transition>
     </mc:Choice>
-    <mc:Fallback>
+    <mc:Fallback xmlns="">
       <p:transition spd="med">
         <p:fade/>
       </p:transition>
     </mc:Fallback>
   </mc:AlternateContent>
+  <p:timing>
+    <p:tnLst>
+      <p:par>
+        <p:cTn id="1" dur="indefinite" restart="never" nodeType="tmRoot"/>
+      </p:par>
+    </p:tnLst>
+  </p:timing>
 </p:sld>
 </file>
 
@@ -4849,12 +4956,19 @@
           <a:lstStyle/>
           <a:p>
             <a:r>
+              <a:rPr lang="de-DE" dirty="0" smtClean="0"/>
+              <a:t>Alle Probleme beziehen sich auf Windows Umgebung</a:t>
+            </a:r>
+            <a:endParaRPr lang="de-DE" dirty="0" smtClean="0"/>
+          </a:p>
+          <a:p>
+            <a:r>
               <a:rPr lang="de-DE" dirty="0" err="1" smtClean="0"/>
               <a:t>Appium</a:t>
             </a:r>
             <a:r>
               <a:rPr lang="de-DE" dirty="0" smtClean="0"/>
-              <a:t> schließt Verbindung zum </a:t>
+              <a:t> / </a:t>
             </a:r>
             <a:r>
               <a:rPr lang="de-DE" dirty="0" err="1" smtClean="0"/>
@@ -4862,13 +4976,18 @@
             </a:r>
             <a:r>
               <a:rPr lang="de-DE" dirty="0" smtClean="0"/>
-              <a:t> Server nach 60 Sekunden ohne Benutzereingabe.</a:t>
-            </a:r>
-          </a:p>
-          <a:p>
+              <a:t> </a:t>
+            </a:r>
             <a:r>
               <a:rPr lang="de-DE" dirty="0" smtClean="0"/>
-              <a:t>Da der </a:t>
+              <a:t>beendet Session nach 60 Sekunden ohne Aktivität</a:t>
+            </a:r>
+          </a:p>
+          <a:p>
+            <a:pPr lvl="1"/>
+            <a:r>
+              <a:rPr lang="de-DE" dirty="0" smtClean="0"/>
+              <a:t>Je nach PC </a:t>
             </a:r>
             <a:r>
               <a:rPr lang="de-DE" dirty="0" err="1" smtClean="0"/>
@@ -4876,14 +4995,34 @@
             </a:r>
             <a:r>
               <a:rPr lang="de-DE" dirty="0" smtClean="0"/>
-              <a:t> sehr langsam arbeitet, ist es nicht möglich innerhalb dieser Zeit etwas zu testen.</a:t>
-            </a:r>
-          </a:p>
-          <a:p>
-            <a:pPr marL="45720" indent="0">
-              <a:buNone/>
-            </a:pPr>
-            <a:endParaRPr lang="de-DE" dirty="0"/>
+              <a:t> langsam, resultiert in Timeout der Session</a:t>
+            </a:r>
+            <a:endParaRPr lang="de-DE" dirty="0"/>
+          </a:p>
+          <a:p>
+            <a:r>
+              <a:rPr lang="de-DE" dirty="0" smtClean="0"/>
+              <a:t>Test Editor</a:t>
+            </a:r>
+          </a:p>
+          <a:p>
+            <a:pPr lvl="1"/>
+            <a:r>
+              <a:rPr lang="de-DE" dirty="0" smtClean="0"/>
+              <a:t>Ausführen der </a:t>
+            </a:r>
+            <a:r>
+              <a:rPr lang="de-DE" b="1" dirty="0" err="1" smtClean="0"/>
+              <a:t>DemoWebTests</a:t>
+            </a:r>
+            <a:r>
+              <a:rPr lang="de-DE" i="1" dirty="0" smtClean="0"/>
+              <a:t> </a:t>
+            </a:r>
+            <a:r>
+              <a:rPr lang="de-DE" dirty="0" smtClean="0"/>
+              <a:t>schlägt fehl</a:t>
+            </a:r>
           </a:p>
         </p:txBody>
       </p:sp>
@@ -4903,8 +5042,8 @@
           <a:lstStyle/>
           <a:p>
             <a:r>
-              <a:rPr lang="de-DE" smtClean="0"/>
-              <a:t>Daniel, Bianca, Maxim und Aljoscha</a:t>
+              <a:rPr lang="de-DE" dirty="0"/>
+              <a:t>Daniel Gehn, Bianca Niklass, Maxim Rjabenko und Aljoscha Czepoks</a:t>
             </a:r>
             <a:endParaRPr lang="de-DE" dirty="0"/>
           </a:p>
@@ -4943,18 +5082,25 @@
   <p:clrMapOvr>
     <a:masterClrMapping/>
   </p:clrMapOvr>
-  <mc:AlternateContent xmlns:mc="http://schemas.openxmlformats.org/markup-compatibility/2006">
-    <mc:Choice xmlns:p14="http://schemas.microsoft.com/office/powerpoint/2010/main" Requires="p14">
+  <mc:AlternateContent xmlns:mc="http://schemas.openxmlformats.org/markup-compatibility/2006" xmlns:p14="http://schemas.microsoft.com/office/powerpoint/2010/main">
+    <mc:Choice Requires="p14">
       <p:transition spd="med" p14:dur="700">
         <p:fade/>
       </p:transition>
     </mc:Choice>
-    <mc:Fallback>
+    <mc:Fallback xmlns="">
       <p:transition spd="med">
         <p:fade/>
       </p:transition>
     </mc:Fallback>
   </mc:AlternateContent>
+  <p:timing>
+    <p:tnLst>
+      <p:par>
+        <p:cTn id="1" dur="indefinite" restart="never" nodeType="tmRoot"/>
+      </p:par>
+    </p:tnLst>
+  </p:timing>
 </p:sld>
 </file>
 
@@ -4992,49 +5138,70 @@
           <a:p>
             <a:r>
               <a:rPr lang="de-DE" dirty="0" smtClean="0"/>
-              <a:t>Lösung der Hürden </a:t>
-            </a:r>
-            <a:endParaRPr lang="de-DE" dirty="0"/>
-          </a:p>
-        </p:txBody>
-      </p:sp>
-      <p:sp>
-        <p:nvSpPr>
-          <p:cNvPr id="3" name="Inhaltsplatzhalter 2"/>
-          <p:cNvSpPr>
-            <a:spLocks noGrp="1"/>
-          </p:cNvSpPr>
+              <a:t>Lösung </a:t>
+            </a:r>
+            <a:r>
+              <a:rPr lang="de-DE" dirty="0" err="1" smtClean="0"/>
+              <a:t>Appium</a:t>
+            </a:r>
+            <a:r>
+              <a:rPr lang="de-DE" dirty="0" smtClean="0"/>
+              <a:t> / </a:t>
+            </a:r>
+            <a:r>
+              <a:rPr lang="de-DE" dirty="0" err="1" smtClean="0"/>
+              <a:t>Selenium</a:t>
+            </a:r>
+            <a:endParaRPr lang="de-DE" dirty="0"/>
+          </a:p>
+        </p:txBody>
+      </p:sp>
+      <p:pic>
+        <p:nvPicPr>
+          <p:cNvPr id="6" name="Inhaltsplatzhalter 5"/>
+          <p:cNvPicPr>
+            <a:picLocks noGrp="1" noChangeAspect="1"/>
+          </p:cNvPicPr>
           <p:nvPr>
             <p:ph idx="1"/>
           </p:nvPr>
+        </p:nvPicPr>
+        <p:blipFill rotWithShape="1">
+          <a:blip r:embed="rId2">
+            <a:extLst>
+              <a:ext uri="{28A0092B-C50C-407E-A947-70E740481C1C}">
+                <a14:useLocalDpi xmlns:a14="http://schemas.microsoft.com/office/drawing/2010/main" val="0"/>
+              </a:ext>
+            </a:extLst>
+          </a:blip>
+          <a:srcRect b="54986"/>
+          <a:stretch/>
+        </p:blipFill>
+        <p:spPr>
+          <a:xfrm>
+            <a:off x="930000" y="1828799"/>
+            <a:ext cx="10103229" cy="3915509"/>
+          </a:xfrm>
+        </p:spPr>
+      </p:pic>
+      <p:sp>
+        <p:nvSpPr>
+          <p:cNvPr id="4" name="Fußzeilenplatzhalter 3"/>
+          <p:cNvSpPr>
+            <a:spLocks noGrp="1"/>
+          </p:cNvSpPr>
+          <p:nvPr>
+            <p:ph type="ftr" sz="quarter" idx="11"/>
+          </p:nvPr>
         </p:nvSpPr>
         <p:spPr/>
         <p:txBody>
           <a:bodyPr/>
           <a:lstStyle/>
           <a:p>
-            <a:endParaRPr lang="de-DE"/>
-          </a:p>
-        </p:txBody>
-      </p:sp>
-      <p:sp>
-        <p:nvSpPr>
-          <p:cNvPr id="4" name="Fußzeilenplatzhalter 3"/>
-          <p:cNvSpPr>
-            <a:spLocks noGrp="1"/>
-          </p:cNvSpPr>
-          <p:nvPr>
-            <p:ph type="ftr" sz="quarter" idx="11"/>
-          </p:nvPr>
-        </p:nvSpPr>
-        <p:spPr/>
-        <p:txBody>
-          <a:bodyPr/>
-          <a:lstStyle/>
-          <a:p>
-            <a:r>
-              <a:rPr lang="de-DE" smtClean="0"/>
-              <a:t>Daniel, Bianca, Maxim und Aljoscha</a:t>
+            <a:r>
+              <a:rPr lang="de-DE" dirty="0"/>
+              <a:t>Daniel Gehn, Bianca Niklass, Maxim Rjabenko und Aljoscha Czepoks</a:t>
             </a:r>
             <a:endParaRPr lang="de-DE" dirty="0"/>
           </a:p>
@@ -5073,18 +5240,552 @@
   <p:clrMapOvr>
     <a:masterClrMapping/>
   </p:clrMapOvr>
-  <mc:AlternateContent xmlns:mc="http://schemas.openxmlformats.org/markup-compatibility/2006">
-    <mc:Choice xmlns:p14="http://schemas.microsoft.com/office/powerpoint/2010/main" Requires="p14">
+  <mc:AlternateContent xmlns:mc="http://schemas.openxmlformats.org/markup-compatibility/2006" xmlns:p14="http://schemas.microsoft.com/office/powerpoint/2010/main">
+    <mc:Choice Requires="p14">
       <p:transition spd="med" p14:dur="700">
         <p:fade/>
       </p:transition>
     </mc:Choice>
-    <mc:Fallback>
+    <mc:Fallback xmlns="">
       <p:transition spd="med">
         <p:fade/>
       </p:transition>
     </mc:Fallback>
   </mc:AlternateContent>
+  <p:timing>
+    <p:tnLst>
+      <p:par>
+        <p:cTn id="1" dur="indefinite" restart="never" nodeType="tmRoot"/>
+      </p:par>
+    </p:tnLst>
+  </p:timing>
+</p:sld>
+</file>
+
+<file path=ppt/slides/slide6.xml><?xml version="1.0" encoding="utf-8"?>
+<p:sld xmlns:a="http://schemas.openxmlformats.org/drawingml/2006/main" xmlns:r="http://schemas.openxmlformats.org/officeDocument/2006/relationships" xmlns:p="http://schemas.openxmlformats.org/presentationml/2006/main">
+  <p:cSld>
+    <p:spTree>
+      <p:nvGrpSpPr>
+        <p:cNvPr id="1" name=""/>
+        <p:cNvGrpSpPr/>
+        <p:nvPr/>
+      </p:nvGrpSpPr>
+      <p:grpSpPr>
+        <a:xfrm>
+          <a:off x="0" y="0"/>
+          <a:ext cx="0" cy="0"/>
+          <a:chOff x="0" y="0"/>
+          <a:chExt cx="0" cy="0"/>
+        </a:xfrm>
+      </p:grpSpPr>
+      <p:sp>
+        <p:nvSpPr>
+          <p:cNvPr id="2" name="Titel 1"/>
+          <p:cNvSpPr>
+            <a:spLocks noGrp="1"/>
+          </p:cNvSpPr>
+          <p:nvPr>
+            <p:ph type="title"/>
+          </p:nvPr>
+        </p:nvSpPr>
+        <p:spPr/>
+        <p:txBody>
+          <a:bodyPr/>
+          <a:lstStyle/>
+          <a:p>
+            <a:r>
+              <a:rPr lang="de-DE" dirty="0" smtClean="0"/>
+              <a:t>Lösung Test Editor</a:t>
+            </a:r>
+            <a:endParaRPr lang="de-DE" dirty="0"/>
+          </a:p>
+        </p:txBody>
+      </p:sp>
+      <p:sp>
+        <p:nvSpPr>
+          <p:cNvPr id="3" name="Inhaltsplatzhalter 2"/>
+          <p:cNvSpPr>
+            <a:spLocks noGrp="1"/>
+          </p:cNvSpPr>
+          <p:nvPr>
+            <p:ph idx="1"/>
+          </p:nvPr>
+        </p:nvSpPr>
+        <p:spPr/>
+        <p:txBody>
+          <a:bodyPr/>
+          <a:lstStyle/>
+          <a:p>
+            <a:r>
+              <a:rPr lang="de-DE" dirty="0"/>
+              <a:t>In </a:t>
+            </a:r>
+            <a:r>
+              <a:rPr lang="de-DE" b="1" dirty="0" err="1" smtClean="0"/>
+              <a:t>TestSzenarien</a:t>
+            </a:r>
+            <a:r>
+              <a:rPr lang="de-DE" b="1" dirty="0" smtClean="0"/>
+              <a:t> -&gt; </a:t>
+            </a:r>
+            <a:r>
+              <a:rPr lang="de-DE" b="1" dirty="0" err="1" smtClean="0"/>
+              <a:t>GoogleStartSzenario</a:t>
+            </a:r>
+            <a:r>
+              <a:rPr lang="de-DE" dirty="0" smtClean="0"/>
+              <a:t> und </a:t>
+            </a:r>
+            <a:r>
+              <a:rPr lang="de-DE" b="1" dirty="0" err="1" smtClean="0"/>
+              <a:t>TestSzenarien</a:t>
+            </a:r>
+            <a:r>
+              <a:rPr lang="de-DE" b="1" dirty="0" smtClean="0"/>
+              <a:t> </a:t>
+            </a:r>
+            <a:r>
+              <a:rPr lang="de-DE" b="1" dirty="0"/>
+              <a:t>-&gt; </a:t>
+            </a:r>
+            <a:r>
+              <a:rPr lang="de-DE" b="1" dirty="0" err="1" smtClean="0"/>
+              <a:t>ApplikationStartSzenario</a:t>
+            </a:r>
+            <a:r>
+              <a:rPr lang="de-DE" i="1" dirty="0" smtClean="0"/>
+              <a:t> </a:t>
+            </a:r>
+            <a:r>
+              <a:rPr lang="de-DE" dirty="0" smtClean="0"/>
+              <a:t>von </a:t>
+            </a:r>
+            <a:r>
+              <a:rPr lang="de-DE" b="1" dirty="0" smtClean="0"/>
+              <a:t>starte Browser Firefox</a:t>
+            </a:r>
+            <a:r>
+              <a:rPr lang="de-DE" dirty="0" smtClean="0"/>
+              <a:t> auf </a:t>
+            </a:r>
+            <a:r>
+              <a:rPr lang="de-DE" b="1" dirty="0" smtClean="0"/>
+              <a:t>starte Browser IE </a:t>
+            </a:r>
+            <a:r>
+              <a:rPr lang="de-DE" dirty="0" smtClean="0"/>
+              <a:t>ändern</a:t>
+            </a:r>
+          </a:p>
+          <a:p>
+            <a:r>
+              <a:rPr lang="de-DE" dirty="0" smtClean="0"/>
+              <a:t>In </a:t>
+            </a:r>
+            <a:r>
+              <a:rPr lang="de-DE" b="1" dirty="0" smtClean="0"/>
+              <a:t>HOME/.</a:t>
+            </a:r>
+            <a:r>
+              <a:rPr lang="de-DE" b="1" dirty="0" err="1" smtClean="0"/>
+              <a:t>testeditor</a:t>
+            </a:r>
+            <a:r>
+              <a:rPr lang="de-DE" b="1" dirty="0" smtClean="0"/>
+              <a:t>/</a:t>
+            </a:r>
+            <a:r>
+              <a:rPr lang="de-DE" b="1" dirty="0" err="1" smtClean="0"/>
+              <a:t>DemoWebTests</a:t>
+            </a:r>
+            <a:r>
+              <a:rPr lang="de-DE" b="1" dirty="0" smtClean="0"/>
+              <a:t>/</a:t>
+            </a:r>
+            <a:r>
+              <a:rPr lang="de-DE" b="1" dirty="0" err="1" smtClean="0"/>
+              <a:t>ElementList.conf</a:t>
+            </a:r>
+            <a:r>
+              <a:rPr lang="de-DE" b="1" dirty="0" smtClean="0"/>
+              <a:t> </a:t>
+            </a:r>
+            <a:r>
+              <a:rPr lang="de-DE" dirty="0" smtClean="0"/>
+              <a:t>die Werte für </a:t>
+            </a:r>
+            <a:r>
+              <a:rPr lang="de-DE" b="1" dirty="0" err="1" smtClean="0"/>
+              <a:t>searchInput</a:t>
+            </a:r>
+            <a:r>
+              <a:rPr lang="de-DE" dirty="0" smtClean="0"/>
+              <a:t> und </a:t>
+            </a:r>
+            <a:r>
+              <a:rPr lang="de-DE" b="1" dirty="0" err="1" smtClean="0"/>
+              <a:t>searchButton</a:t>
+            </a:r>
+            <a:r>
+              <a:rPr lang="de-DE" dirty="0" smtClean="0"/>
+              <a:t> anpassen</a:t>
+            </a:r>
+          </a:p>
+          <a:p>
+            <a:pPr lvl="1"/>
+            <a:r>
+              <a:rPr lang="de-DE" dirty="0" smtClean="0"/>
+              <a:t>Siehe Quelltext von Google</a:t>
+            </a:r>
+          </a:p>
+        </p:txBody>
+      </p:sp>
+      <p:sp>
+        <p:nvSpPr>
+          <p:cNvPr id="4" name="Fußzeilenplatzhalter 3"/>
+          <p:cNvSpPr>
+            <a:spLocks noGrp="1"/>
+          </p:cNvSpPr>
+          <p:nvPr>
+            <p:ph type="ftr" sz="quarter" idx="11"/>
+          </p:nvPr>
+        </p:nvSpPr>
+        <p:spPr/>
+        <p:txBody>
+          <a:bodyPr/>
+          <a:lstStyle/>
+          <a:p>
+            <a:r>
+              <a:rPr lang="de-DE" smtClean="0"/>
+              <a:t>Daniel Gehn, Bianca Niklass, Maxim Rjabenko und Aljoscha Czepoks</a:t>
+            </a:r>
+            <a:endParaRPr lang="de-DE" dirty="0"/>
+          </a:p>
+        </p:txBody>
+      </p:sp>
+      <p:sp>
+        <p:nvSpPr>
+          <p:cNvPr id="5" name="Foliennummernplatzhalter 4"/>
+          <p:cNvSpPr>
+            <a:spLocks noGrp="1"/>
+          </p:cNvSpPr>
+          <p:nvPr>
+            <p:ph type="sldNum" sz="quarter" idx="12"/>
+          </p:nvPr>
+        </p:nvSpPr>
+        <p:spPr/>
+        <p:txBody>
+          <a:bodyPr/>
+          <a:lstStyle/>
+          <a:p>
+            <a:fld id="{E31375A4-56A4-47D6-9801-1991572033F7}" type="slidenum">
+              <a:rPr lang="de-DE" smtClean="0"/>
+              <a:t>6</a:t>
+            </a:fld>
+            <a:endParaRPr lang="de-DE" dirty="0"/>
+          </a:p>
+        </p:txBody>
+      </p:sp>
+    </p:spTree>
+    <p:extLst>
+      <p:ext uri="{BB962C8B-B14F-4D97-AF65-F5344CB8AC3E}">
+        <p14:creationId xmlns:p14="http://schemas.microsoft.com/office/powerpoint/2010/main" val="3974211533"/>
+      </p:ext>
+    </p:extLst>
+  </p:cSld>
+  <p:clrMapOvr>
+    <a:masterClrMapping/>
+  </p:clrMapOvr>
+  <mc:AlternateContent xmlns:mc="http://schemas.openxmlformats.org/markup-compatibility/2006" xmlns:p14="http://schemas.microsoft.com/office/powerpoint/2010/main">
+    <mc:Choice Requires="p14">
+      <p:transition spd="med" p14:dur="700">
+        <p:fade/>
+      </p:transition>
+    </mc:Choice>
+    <mc:Fallback xmlns="">
+      <p:transition spd="med">
+        <p:fade/>
+      </p:transition>
+    </mc:Fallback>
+  </mc:AlternateContent>
+  <p:timing>
+    <p:tnLst>
+      <p:par>
+        <p:cTn id="1" dur="indefinite" restart="never" nodeType="tmRoot"/>
+      </p:par>
+    </p:tnLst>
+  </p:timing>
+</p:sld>
+</file>
+
+<file path=ppt/slides/slide7.xml><?xml version="1.0" encoding="utf-8"?>
+<p:sld xmlns:a="http://schemas.openxmlformats.org/drawingml/2006/main" xmlns:r="http://schemas.openxmlformats.org/officeDocument/2006/relationships" xmlns:p="http://schemas.openxmlformats.org/presentationml/2006/main">
+  <p:cSld>
+    <p:spTree>
+      <p:nvGrpSpPr>
+        <p:cNvPr id="1" name=""/>
+        <p:cNvGrpSpPr/>
+        <p:nvPr/>
+      </p:nvGrpSpPr>
+      <p:grpSpPr>
+        <a:xfrm>
+          <a:off x="0" y="0"/>
+          <a:ext cx="0" cy="0"/>
+          <a:chOff x="0" y="0"/>
+          <a:chExt cx="0" cy="0"/>
+        </a:xfrm>
+      </p:grpSpPr>
+      <p:sp>
+        <p:nvSpPr>
+          <p:cNvPr id="2" name="Titel 1"/>
+          <p:cNvSpPr>
+            <a:spLocks noGrp="1"/>
+          </p:cNvSpPr>
+          <p:nvPr>
+            <p:ph type="title"/>
+          </p:nvPr>
+        </p:nvSpPr>
+        <p:spPr/>
+        <p:txBody>
+          <a:bodyPr/>
+          <a:lstStyle/>
+          <a:p>
+            <a:r>
+              <a:rPr lang="de-DE" dirty="0" smtClean="0"/>
+              <a:t>Ausblick</a:t>
+            </a:r>
+            <a:endParaRPr lang="de-DE" dirty="0"/>
+          </a:p>
+        </p:txBody>
+      </p:sp>
+      <p:sp>
+        <p:nvSpPr>
+          <p:cNvPr id="3" name="Inhaltsplatzhalter 2"/>
+          <p:cNvSpPr>
+            <a:spLocks noGrp="1"/>
+          </p:cNvSpPr>
+          <p:nvPr>
+            <p:ph sz="half" idx="1"/>
+          </p:nvPr>
+        </p:nvSpPr>
+        <p:spPr/>
+        <p:txBody>
+          <a:bodyPr/>
+          <a:lstStyle/>
+          <a:p>
+            <a:r>
+              <a:rPr lang="de-DE" dirty="0"/>
+              <a:t>Test Editor Test-Treiber für Apps implementieren</a:t>
+            </a:r>
+          </a:p>
+          <a:p>
+            <a:pPr lvl="1"/>
+            <a:r>
+              <a:rPr lang="de-DE" dirty="0" err="1"/>
+              <a:t>Appium</a:t>
+            </a:r>
+            <a:r>
+              <a:rPr lang="de-DE" dirty="0"/>
+              <a:t> </a:t>
+            </a:r>
+            <a:r>
+              <a:rPr lang="de-DE" dirty="0" err="1"/>
+              <a:t>Fixture</a:t>
+            </a:r>
+            <a:endParaRPr lang="de-DE" dirty="0"/>
+          </a:p>
+          <a:p>
+            <a:pPr lvl="1"/>
+            <a:r>
+              <a:rPr lang="de-DE" dirty="0"/>
+              <a:t>Scenario Library</a:t>
+            </a:r>
+          </a:p>
+          <a:p>
+            <a:pPr lvl="1"/>
+            <a:r>
+              <a:rPr lang="de-DE" dirty="0"/>
+              <a:t>Technical Binding </a:t>
+            </a:r>
+            <a:r>
+              <a:rPr lang="de-DE" dirty="0" err="1"/>
+              <a:t>Types</a:t>
+            </a:r>
+            <a:endParaRPr lang="de-DE" dirty="0"/>
+          </a:p>
+          <a:p>
+            <a:pPr lvl="1"/>
+            <a:r>
+              <a:rPr lang="de-DE" dirty="0"/>
+              <a:t>All Action Groups</a:t>
+            </a:r>
+          </a:p>
+          <a:p>
+            <a:pPr lvl="1"/>
+            <a:r>
+              <a:rPr lang="de-DE" dirty="0"/>
+              <a:t>Element Liste</a:t>
+            </a:r>
+          </a:p>
+        </p:txBody>
+      </p:sp>
+      <p:sp>
+        <p:nvSpPr>
+          <p:cNvPr id="4" name="Inhaltsplatzhalter 3"/>
+          <p:cNvSpPr>
+            <a:spLocks noGrp="1"/>
+          </p:cNvSpPr>
+          <p:nvPr>
+            <p:ph sz="half" idx="2"/>
+          </p:nvPr>
+        </p:nvSpPr>
+        <p:spPr/>
+        <p:txBody>
+          <a:bodyPr/>
+          <a:lstStyle/>
+          <a:p>
+            <a:r>
+              <a:rPr lang="de-DE" dirty="0"/>
+              <a:t>App Elemente in Test Editor auswählbar machen</a:t>
+            </a:r>
+          </a:p>
+          <a:p>
+            <a:pPr lvl="1"/>
+            <a:r>
+              <a:rPr lang="de-DE" dirty="0" smtClean="0"/>
+              <a:t>Probleme</a:t>
+            </a:r>
+          </a:p>
+          <a:p>
+            <a:pPr lvl="2"/>
+            <a:r>
+              <a:rPr lang="de-DE" dirty="0" smtClean="0"/>
+              <a:t>Nutzer </a:t>
+            </a:r>
+            <a:r>
+              <a:rPr lang="de-DE" dirty="0"/>
+              <a:t>muss keine kryptischen Namen für Felder und Buttons </a:t>
+            </a:r>
+            <a:r>
+              <a:rPr lang="de-DE" dirty="0" smtClean="0"/>
+              <a:t>angeben</a:t>
+            </a:r>
+          </a:p>
+          <a:p>
+            <a:pPr lvl="2"/>
+            <a:r>
+              <a:rPr lang="de-DE" dirty="0" smtClean="0"/>
+              <a:t>Teilweise Buttons und Textfelder nicht eindeutig, somit schwierig für einfachen Nutzer</a:t>
+            </a:r>
+          </a:p>
+          <a:p>
+            <a:pPr lvl="1"/>
+            <a:r>
+              <a:rPr lang="de-DE" dirty="0" smtClean="0"/>
+              <a:t>Lösungen</a:t>
+            </a:r>
+            <a:endParaRPr lang="de-DE" dirty="0"/>
+          </a:p>
+          <a:p>
+            <a:pPr lvl="2"/>
+            <a:r>
+              <a:rPr lang="de-DE" dirty="0" err="1"/>
+              <a:t>Inspector</a:t>
+            </a:r>
+            <a:r>
+              <a:rPr lang="de-DE" dirty="0"/>
+              <a:t> für Test Editor anpassen</a:t>
+            </a:r>
+          </a:p>
+          <a:p>
+            <a:pPr lvl="2"/>
+            <a:r>
+              <a:rPr lang="de-DE" dirty="0" err="1"/>
+              <a:t>Inspector</a:t>
+            </a:r>
+            <a:r>
+              <a:rPr lang="de-DE" dirty="0"/>
+              <a:t> in Test Editor integrieren</a:t>
+            </a:r>
+          </a:p>
+        </p:txBody>
+      </p:sp>
+      <p:sp>
+        <p:nvSpPr>
+          <p:cNvPr id="5" name="Fußzeilenplatzhalter 4"/>
+          <p:cNvSpPr>
+            <a:spLocks noGrp="1"/>
+          </p:cNvSpPr>
+          <p:nvPr>
+            <p:ph type="ftr" sz="quarter" idx="11"/>
+          </p:nvPr>
+        </p:nvSpPr>
+        <p:spPr/>
+        <p:txBody>
+          <a:bodyPr/>
+          <a:lstStyle/>
+          <a:p>
+            <a:r>
+              <a:rPr lang="de-DE" smtClean="0"/>
+              <a:t>Daniel Gehn, Bianca Niklass, Maxim Rjabenko und Aljoscha Czepoks</a:t>
+            </a:r>
+            <a:endParaRPr lang="de-DE" dirty="0"/>
+          </a:p>
+        </p:txBody>
+      </p:sp>
+      <p:sp>
+        <p:nvSpPr>
+          <p:cNvPr id="6" name="Foliennummernplatzhalter 5"/>
+          <p:cNvSpPr>
+            <a:spLocks noGrp="1"/>
+          </p:cNvSpPr>
+          <p:nvPr>
+            <p:ph type="sldNum" sz="quarter" idx="12"/>
+          </p:nvPr>
+        </p:nvSpPr>
+        <p:spPr/>
+        <p:txBody>
+          <a:bodyPr/>
+          <a:lstStyle/>
+          <a:p>
+            <a:fld id="{E31375A4-56A4-47D6-9801-1991572033F7}" type="slidenum">
+              <a:rPr lang="de-DE" smtClean="0"/>
+              <a:t>7</a:t>
+            </a:fld>
+            <a:endParaRPr lang="de-DE" dirty="0"/>
+          </a:p>
+        </p:txBody>
+      </p:sp>
+    </p:spTree>
+    <p:extLst>
+      <p:ext uri="{BB962C8B-B14F-4D97-AF65-F5344CB8AC3E}">
+        <p14:creationId xmlns:p14="http://schemas.microsoft.com/office/powerpoint/2010/main" val="3622840435"/>
+      </p:ext>
+    </p:extLst>
+  </p:cSld>
+  <p:clrMapOvr>
+    <a:masterClrMapping/>
+  </p:clrMapOvr>
+  <mc:AlternateContent xmlns:mc="http://schemas.openxmlformats.org/markup-compatibility/2006" xmlns:p14="http://schemas.microsoft.com/office/powerpoint/2010/main">
+    <mc:Choice Requires="p14">
+      <p:transition spd="med" p14:dur="700">
+        <p:fade/>
+      </p:transition>
+    </mc:Choice>
+    <mc:Fallback xmlns="">
+      <p:transition spd="med">
+        <p:fade/>
+      </p:transition>
+    </mc:Fallback>
+  </mc:AlternateContent>
+  <p:timing>
+    <p:tnLst>
+      <p:par>
+        <p:cTn id="1" dur="indefinite" restart="never" nodeType="tmRoot"/>
+      </p:par>
+    </p:tnLst>
+  </p:timing>
 </p:sld>
 </file>
 

</xml_diff>

<commit_message>
Einführung aktualisiert. Rollen ergänzt.
</commit_message>
<xml_diff>
--- a/TestenMileStone1.pptx
+++ b/TestenMileStone1.pptx
@@ -220,7 +220,7 @@
           <a:p>
             <a:fld id="{65DD71D7-55AC-46BD-81B3-09AB2F9EFBD8}" type="datetimeFigureOut">
               <a:rPr lang="de-DE" smtClean="0"/>
-              <a:t>16.10.2015</a:t>
+              <a:t>19.10.2015</a:t>
             </a:fld>
             <a:endParaRPr lang="de-DE" dirty="0"/>
           </a:p>
@@ -385,7 +385,7 @@
           <a:p>
             <a:fld id="{1F89424F-BB59-4F4E-9822-4CA3E770FFD2}" type="datetimeFigureOut">
               <a:rPr lang="de-DE" smtClean="0"/>
-              <a:t>16.10.2015</a:t>
+              <a:t>19.10.2015</a:t>
             </a:fld>
             <a:endParaRPr lang="de-DE" dirty="0"/>
           </a:p>
@@ -1112,7 +1112,7 @@
           <a:p>
             <a:fld id="{537F698A-8CEE-4BF3-BEC8-0ABA6C1BFF10}" type="datetime1">
               <a:rPr lang="de-DE" smtClean="0"/>
-              <a:t>16.10.2015</a:t>
+              <a:t>19.10.2015</a:t>
             </a:fld>
             <a:endParaRPr lang="de-DE" dirty="0"/>
           </a:p>
@@ -1315,7 +1315,7 @@
           <a:p>
             <a:fld id="{21EA3026-B01D-4A07-9460-F7E0EBAC28CD}" type="datetime1">
               <a:rPr lang="de-DE" smtClean="0"/>
-              <a:t>16.10.2015</a:t>
+              <a:t>19.10.2015</a:t>
             </a:fld>
             <a:endParaRPr lang="de-DE" dirty="0"/>
           </a:p>
@@ -1508,7 +1508,7 @@
           <a:p>
             <a:fld id="{F66A0F23-FBCB-420B-8C36-8A5C93F98E1D}" type="datetime1">
               <a:rPr lang="de-DE" smtClean="0"/>
-              <a:t>16.10.2015</a:t>
+              <a:t>19.10.2015</a:t>
             </a:fld>
             <a:endParaRPr lang="de-DE" dirty="0"/>
           </a:p>
@@ -2121,7 +2121,7 @@
           <a:p>
             <a:fld id="{8A458D03-FBAF-4BE9-900A-26E29E2C0671}" type="datetime1">
               <a:rPr lang="de-DE" smtClean="0"/>
-              <a:t>16.10.2015</a:t>
+              <a:t>19.10.2015</a:t>
             </a:fld>
             <a:endParaRPr lang="de-DE" dirty="0"/>
           </a:p>
@@ -2576,7 +2576,7 @@
           <a:p>
             <a:fld id="{E70E15B3-2ABA-4AD8-8437-D701EFDB75E9}" type="datetime1">
               <a:rPr lang="de-DE" smtClean="0"/>
-              <a:t>16.10.2015</a:t>
+              <a:t>19.10.2015</a:t>
             </a:fld>
             <a:endParaRPr lang="de-DE" dirty="0"/>
           </a:p>
@@ -2717,7 +2717,7 @@
           <a:p>
             <a:fld id="{EC022FFA-086D-48E4-A3A9-F2E6ADCC7A7A}" type="datetime1">
               <a:rPr lang="de-DE" smtClean="0"/>
-              <a:t>16.10.2015</a:t>
+              <a:t>19.10.2015</a:t>
             </a:fld>
             <a:endParaRPr lang="de-DE" dirty="0"/>
           </a:p>
@@ -2835,7 +2835,7 @@
           <a:p>
             <a:fld id="{2ABA1BE5-10BE-4EC0-8AF8-1FF2CE7C8C7C}" type="datetime1">
               <a:rPr lang="de-DE" smtClean="0"/>
-              <a:t>16.10.2015</a:t>
+              <a:t>19.10.2015</a:t>
             </a:fld>
             <a:endParaRPr lang="de-DE" dirty="0"/>
           </a:p>
@@ -3271,7 +3271,7 @@
           <a:p>
             <a:fld id="{06AEED3C-F3D4-413C-88C0-8F79A6BD5893}" type="datetime1">
               <a:rPr lang="de-DE" smtClean="0"/>
-              <a:t>16.10.2015</a:t>
+              <a:t>19.10.2015</a:t>
             </a:fld>
             <a:endParaRPr lang="de-DE" dirty="0"/>
           </a:p>
@@ -3697,7 +3697,7 @@
           <a:p>
             <a:fld id="{8A0BF93F-18FA-420B-8AAE-FD2EDBFEC862}" type="datetime1">
               <a:rPr lang="de-DE" smtClean="0"/>
-              <a:t>16.10.2015</a:t>
+              <a:t>19.10.2015</a:t>
             </a:fld>
             <a:endParaRPr lang="de-DE" dirty="0"/>
           </a:p>
@@ -3981,7 +3981,7 @@
           <a:p>
             <a:fld id="{88460AF1-5B98-4D10-B224-FDE8F6480635}" type="datetime1">
               <a:rPr lang="de-DE" smtClean="0"/>
-              <a:t>16.10.2015</a:t>
+              <a:t>19.10.2015</a:t>
             </a:fld>
             <a:endParaRPr lang="de-DE" dirty="0"/>
           </a:p>
@@ -4650,13 +4650,8 @@
             <a:pPr lvl="1"/>
             <a:r>
               <a:rPr lang="de-DE" dirty="0" smtClean="0"/>
-              <a:t>Lösungen</a:t>
-            </a:r>
-            <a:r>
-              <a:rPr lang="de-DE" dirty="0" smtClean="0"/>
-              <a:t> </a:t>
-            </a:r>
-            <a:endParaRPr lang="de-DE" dirty="0" smtClean="0"/>
+              <a:t>Lösungen </a:t>
+            </a:r>
           </a:p>
           <a:p>
             <a:r>
@@ -4665,44 +4660,26 @@
             </a:r>
             <a:endParaRPr lang="de-DE" dirty="0" smtClean="0"/>
           </a:p>
-          <a:p>
-            <a:pPr lvl="1"/>
+        </p:txBody>
+      </p:sp>
+      <p:sp>
+        <p:nvSpPr>
+          <p:cNvPr id="4" name="Fußzeilenplatzhalter 3"/>
+          <p:cNvSpPr>
+            <a:spLocks noGrp="1"/>
+          </p:cNvSpPr>
+          <p:nvPr>
+            <p:ph type="ftr" sz="quarter" idx="11"/>
+          </p:nvPr>
+        </p:nvSpPr>
+        <p:spPr/>
+        <p:txBody>
+          <a:bodyPr/>
+          <a:lstStyle/>
+          <a:p>
             <a:r>
               <a:rPr lang="de-DE" dirty="0" smtClean="0"/>
-              <a:t>Projektstrukturplan</a:t>
-            </a:r>
-          </a:p>
-          <a:p>
-            <a:endParaRPr lang="de-DE" dirty="0" smtClean="0"/>
-          </a:p>
-        </p:txBody>
-      </p:sp>
-      <p:sp>
-        <p:nvSpPr>
-          <p:cNvPr id="4" name="Fußzeilenplatzhalter 3"/>
-          <p:cNvSpPr>
-            <a:spLocks noGrp="1"/>
-          </p:cNvSpPr>
-          <p:nvPr>
-            <p:ph type="ftr" sz="quarter" idx="11"/>
-          </p:nvPr>
-        </p:nvSpPr>
-        <p:spPr/>
-        <p:txBody>
-          <a:bodyPr/>
-          <a:lstStyle/>
-          <a:p>
-            <a:r>
-              <a:rPr lang="de-DE" dirty="0" smtClean="0"/>
-              <a:t>Daniel Gehn, Bianca Niklass, Maxim Rjabenko </a:t>
-            </a:r>
-            <a:r>
-              <a:rPr lang="de-DE" dirty="0" smtClean="0"/>
-              <a:t>und </a:t>
-            </a:r>
-            <a:r>
-              <a:rPr lang="de-DE" dirty="0" smtClean="0"/>
-              <a:t>Aljoscha Czepoks</a:t>
+              <a:t>Daniel Gehn, Bianca Niklass, Maxim Rjabenko und Aljoscha Czepoks</a:t>
             </a:r>
             <a:endParaRPr lang="de-DE" dirty="0"/>
           </a:p>
@@ -4818,6 +4795,55 @@
           <a:bodyPr/>
           <a:lstStyle/>
           <a:p>
+            <a:r>
+              <a:rPr lang="de-DE" dirty="0" smtClean="0"/>
+              <a:t>Guidelines unvollständig bzw. für die falsche Plattform</a:t>
+            </a:r>
+          </a:p>
+          <a:p>
+            <a:pPr lvl="1"/>
+            <a:r>
+              <a:rPr lang="de-DE" dirty="0" smtClean="0"/>
+              <a:t>Dadurch häufig Abweichung von den „nötigen“ Paketen.</a:t>
+            </a:r>
+          </a:p>
+          <a:p>
+            <a:r>
+              <a:rPr lang="de-DE" dirty="0" smtClean="0"/>
+              <a:t>Rollen</a:t>
+            </a:r>
+          </a:p>
+          <a:p>
+            <a:pPr lvl="1"/>
+            <a:r>
+              <a:rPr lang="de-DE" dirty="0" smtClean="0"/>
+              <a:t>Projektleitung:</a:t>
+            </a:r>
+            <a:r>
+              <a:rPr lang="de-DE" dirty="0" smtClean="0"/>
+              <a:t> Daniel Gehen</a:t>
+            </a:r>
+          </a:p>
+          <a:p>
+            <a:pPr lvl="1"/>
+            <a:r>
+              <a:rPr lang="de-DE" dirty="0" smtClean="0"/>
+              <a:t>Dokumentation: Aljoscha Czepoks</a:t>
+            </a:r>
+          </a:p>
+          <a:p>
+            <a:pPr lvl="1"/>
+            <a:r>
+              <a:rPr lang="de-DE" dirty="0" smtClean="0"/>
+              <a:t>Qualitätssicherung: Bianca </a:t>
+            </a:r>
+            <a:r>
+              <a:rPr lang="de-DE" dirty="0" err="1" smtClean="0"/>
+              <a:t>Niklass</a:t>
+            </a:r>
+            <a:endParaRPr lang="de-DE" dirty="0" smtClean="0"/>
+          </a:p>
+          <a:p>
             <a:endParaRPr lang="de-DE" dirty="0"/>
           </a:p>
         </p:txBody>
@@ -4841,7 +4867,6 @@
               <a:rPr lang="de-DE" dirty="0"/>
               <a:t>Daniel Gehn, Bianca Niklass, Maxim Rjabenko und Aljoscha Czepoks</a:t>
             </a:r>
-            <a:endParaRPr lang="de-DE" dirty="0"/>
           </a:p>
         </p:txBody>
       </p:sp>
@@ -4959,7 +4984,6 @@
               <a:rPr lang="de-DE" dirty="0" smtClean="0"/>
               <a:t>Alle Probleme beziehen sich auf Windows Umgebung</a:t>
             </a:r>
-            <a:endParaRPr lang="de-DE" dirty="0" smtClean="0"/>
           </a:p>
           <a:p>
             <a:r>
@@ -4976,11 +5000,7 @@
             </a:r>
             <a:r>
               <a:rPr lang="de-DE" dirty="0" smtClean="0"/>
-              <a:t> </a:t>
-            </a:r>
-            <a:r>
-              <a:rPr lang="de-DE" dirty="0" smtClean="0"/>
-              <a:t>beendet Session nach 60 Sekunden ohne Aktivität</a:t>
+              <a:t> beendet Session nach 60 Sekunden ohne Aktivität</a:t>
             </a:r>
           </a:p>
           <a:p>
@@ -5045,7 +5065,6 @@
               <a:rPr lang="de-DE" dirty="0"/>
               <a:t>Daniel Gehn, Bianca Niklass, Maxim Rjabenko und Aljoscha Czepoks</a:t>
             </a:r>
-            <a:endParaRPr lang="de-DE" dirty="0"/>
           </a:p>
         </p:txBody>
       </p:sp>
@@ -5203,7 +5222,6 @@
               <a:rPr lang="de-DE" dirty="0"/>
               <a:t>Daniel Gehn, Bianca Niklass, Maxim Rjabenko und Aljoscha Czepoks</a:t>
             </a:r>
-            <a:endParaRPr lang="de-DE" dirty="0"/>
           </a:p>
         </p:txBody>
       </p:sp>

</xml_diff>

<commit_message>
Up to date version
</commit_message>
<xml_diff>
--- a/TestenMileStone1.pptx
+++ b/TestenMileStone1.pptx
@@ -4658,7 +4658,6 @@
               <a:rPr lang="de-DE" dirty="0" smtClean="0"/>
               <a:t>Ausblick</a:t>
             </a:r>
-            <a:endParaRPr lang="de-DE" dirty="0" smtClean="0"/>
           </a:p>
         </p:txBody>
       </p:sp>
@@ -4803,8 +4802,16 @@
           <a:p>
             <a:pPr lvl="1"/>
             <a:r>
-              <a:rPr lang="de-DE" dirty="0" smtClean="0"/>
-              <a:t>Dadurch häufig Abweichung von den „nötigen“ Paketen.</a:t>
+              <a:rPr lang="de-DE" dirty="0"/>
+              <a:t>d</a:t>
+            </a:r>
+            <a:r>
+              <a:rPr lang="de-DE" dirty="0" smtClean="0"/>
+              <a:t>adurch </a:t>
+            </a:r>
+            <a:r>
+              <a:rPr lang="de-DE" dirty="0" smtClean="0"/>
+              <a:t>häufig Abweichung von den „nötigen“ Paketen.</a:t>
             </a:r>
           </a:p>
           <a:p>
@@ -4817,34 +4824,45 @@
             <a:pPr lvl="1"/>
             <a:r>
               <a:rPr lang="de-DE" dirty="0" smtClean="0"/>
-              <a:t>Projektleitung:</a:t>
-            </a:r>
-            <a:r>
-              <a:rPr lang="de-DE" dirty="0" smtClean="0"/>
-              <a:t> Daniel Gehen</a:t>
+              <a:t>Projektleitung: Daniel </a:t>
+            </a:r>
+            <a:r>
+              <a:rPr lang="de-DE" dirty="0" smtClean="0"/>
+              <a:t>Gehn</a:t>
             </a:r>
           </a:p>
           <a:p>
             <a:pPr lvl="1"/>
             <a:r>
               <a:rPr lang="de-DE" dirty="0" smtClean="0"/>
-              <a:t>Dokumentation: Aljoscha Czepoks</a:t>
+              <a:t>Entwicklung: Daniel Gehn</a:t>
             </a:r>
           </a:p>
           <a:p>
             <a:pPr lvl="1"/>
             <a:r>
               <a:rPr lang="de-DE" dirty="0" smtClean="0"/>
-              <a:t>Qualitätssicherung: Bianca </a:t>
-            </a:r>
-            <a:r>
-              <a:rPr lang="de-DE" dirty="0" err="1" smtClean="0"/>
+              <a:t>Dokumentation</a:t>
+            </a:r>
+            <a:r>
+              <a:rPr lang="de-DE" dirty="0" smtClean="0"/>
+              <a:t>: Aljoscha Czepoks</a:t>
+            </a:r>
+          </a:p>
+          <a:p>
+            <a:pPr lvl="1"/>
+            <a:r>
+              <a:rPr lang="de-DE" dirty="0" smtClean="0"/>
+              <a:t>Qualitätssicherung</a:t>
+            </a:r>
+            <a:r>
+              <a:rPr lang="de-DE" dirty="0" smtClean="0"/>
+              <a:t>: Bianca </a:t>
+            </a:r>
+            <a:r>
+              <a:rPr lang="de-DE" dirty="0" smtClean="0"/>
               <a:t>Niklass</a:t>
             </a:r>
-            <a:endParaRPr lang="de-DE" dirty="0" smtClean="0"/>
-          </a:p>
-          <a:p>
-            <a:endParaRPr lang="de-DE" dirty="0"/>
           </a:p>
         </p:txBody>
       </p:sp>
@@ -5015,7 +5033,11 @@
             </a:r>
             <a:r>
               <a:rPr lang="de-DE" dirty="0" smtClean="0"/>
-              <a:t> langsam, resultiert in Timeout der Session</a:t>
+              <a:t> sehr </a:t>
+            </a:r>
+            <a:r>
+              <a:rPr lang="de-DE" dirty="0" smtClean="0"/>
+              <a:t>langsam, resultiert in Timeout der Session</a:t>
             </a:r>
             <a:endParaRPr lang="de-DE" dirty="0"/>
           </a:p>

</xml_diff>